<commit_message>
Changed background for all slides.
</commit_message>
<xml_diff>
--- a/doc/library_as_brand.pptx
+++ b/doc/library_as_brand.pptx
@@ -2,7 +2,7 @@
 <file path=ppt/presentation.xml><?xml version="1.0" encoding="utf-8"?>
 <p:presentation xmlns:a="http://schemas.openxmlformats.org/drawingml/2006/main" xmlns:r="http://schemas.openxmlformats.org/officeDocument/2006/relationships" xmlns:p="http://schemas.openxmlformats.org/presentationml/2006/main" saveSubsetFonts="1">
   <p:sldMasterIdLst>
-    <p:sldMasterId id="2147483648" r:id="rId1"/>
+    <p:sldMasterId id="2147483767" r:id="rId1"/>
   </p:sldMasterIdLst>
   <p:notesMasterIdLst>
     <p:notesMasterId r:id="rId12"/>
@@ -116,6 +116,14 @@
       </a:defRPr>
     </a:lvl9pPr>
   </p:defaultTextStyle>
+  <p:extLst>
+    <p:ext uri="{EFAFB233-063F-42B5-8137-9DF3F51BA10A}">
+      <p15:sldGuideLst xmlns:p15="http://schemas.microsoft.com/office/powerpoint/2012/main"/>
+    </p:ext>
+    <p:ext uri="{2D200454-40CA-4A62-9FC3-DE9A4176ACB9}">
+      <p15:notesGuideLst xmlns:p15="http://schemas.microsoft.com/office/powerpoint/2012/main"/>
+    </p:ext>
+  </p:extLst>
 </p:presentation>
 </file>
 
@@ -1369,7 +1377,7 @@
     </p:spTree>
     <p:extLst>
       <p:ext uri="{BB962C8B-B14F-4D97-AF65-F5344CB8AC3E}">
-        <p14:creationId xmlns:p14="http://schemas.microsoft.com/office/powerpoint/2010/main" val="415063734"/>
+        <p14:creationId xmlns:p14="http://schemas.microsoft.com/office/powerpoint/2010/main" val="2796038171"/>
       </p:ext>
     </p:extLst>
   </p:cSld>
@@ -1437,7 +1445,7 @@
             <a:pPr lvl="0"/>
             <a:r>
               <a:rPr lang="en-US" smtClean="0"/>
-              <a:t>Edit Master text styles</a:t>
+              <a:t>Click to edit Master text styles</a:t>
             </a:r>
           </a:p>
           <a:p>
@@ -1539,7 +1547,7 @@
     </p:spTree>
     <p:extLst>
       <p:ext uri="{BB962C8B-B14F-4D97-AF65-F5344CB8AC3E}">
-        <p14:creationId xmlns:p14="http://schemas.microsoft.com/office/powerpoint/2010/main" val="3533652900"/>
+        <p14:creationId xmlns:p14="http://schemas.microsoft.com/office/powerpoint/2010/main" val="2368607299"/>
       </p:ext>
     </p:extLst>
   </p:cSld>
@@ -1617,7 +1625,7 @@
             <a:pPr lvl="0"/>
             <a:r>
               <a:rPr lang="en-US" smtClean="0"/>
-              <a:t>Edit Master text styles</a:t>
+              <a:t>Click to edit Master text styles</a:t>
             </a:r>
           </a:p>
           <a:p>
@@ -1719,7 +1727,7 @@
     </p:spTree>
     <p:extLst>
       <p:ext uri="{BB962C8B-B14F-4D97-AF65-F5344CB8AC3E}">
-        <p14:creationId xmlns:p14="http://schemas.microsoft.com/office/powerpoint/2010/main" val="1866986576"/>
+        <p14:creationId xmlns:p14="http://schemas.microsoft.com/office/powerpoint/2010/main" val="412918338"/>
       </p:ext>
     </p:extLst>
   </p:cSld>
@@ -1787,7 +1795,7 @@
             <a:pPr lvl="0"/>
             <a:r>
               <a:rPr lang="en-US" smtClean="0"/>
-              <a:t>Edit Master text styles</a:t>
+              <a:t>Click to edit Master text styles</a:t>
             </a:r>
           </a:p>
           <a:p>
@@ -1889,7 +1897,7 @@
     </p:spTree>
     <p:extLst>
       <p:ext uri="{BB962C8B-B14F-4D97-AF65-F5344CB8AC3E}">
-        <p14:creationId xmlns:p14="http://schemas.microsoft.com/office/powerpoint/2010/main" val="66834729"/>
+        <p14:creationId xmlns:p14="http://schemas.microsoft.com/office/powerpoint/2010/main" val="1018271765"/>
       </p:ext>
     </p:extLst>
   </p:cSld>
@@ -2062,7 +2070,7 @@
             <a:pPr lvl="0"/>
             <a:r>
               <a:rPr lang="en-US" smtClean="0"/>
-              <a:t>Edit Master text styles</a:t>
+              <a:t>Click to edit Master text styles</a:t>
             </a:r>
           </a:p>
         </p:txBody>
@@ -2135,7 +2143,7 @@
     </p:spTree>
     <p:extLst>
       <p:ext uri="{BB962C8B-B14F-4D97-AF65-F5344CB8AC3E}">
-        <p14:creationId xmlns:p14="http://schemas.microsoft.com/office/powerpoint/2010/main" val="3317044929"/>
+        <p14:creationId xmlns:p14="http://schemas.microsoft.com/office/powerpoint/2010/main" val="164628049"/>
       </p:ext>
     </p:extLst>
   </p:cSld>
@@ -2208,7 +2216,7 @@
             <a:pPr lvl="0"/>
             <a:r>
               <a:rPr lang="en-US" smtClean="0"/>
-              <a:t>Edit Master text styles</a:t>
+              <a:t>Click to edit Master text styles</a:t>
             </a:r>
           </a:p>
           <a:p>
@@ -2265,7 +2273,7 @@
             <a:pPr lvl="0"/>
             <a:r>
               <a:rPr lang="en-US" smtClean="0"/>
-              <a:t>Edit Master text styles</a:t>
+              <a:t>Click to edit Master text styles</a:t>
             </a:r>
           </a:p>
           <a:p>
@@ -2367,7 +2375,7 @@
     </p:spTree>
     <p:extLst>
       <p:ext uri="{BB962C8B-B14F-4D97-AF65-F5344CB8AC3E}">
-        <p14:creationId xmlns:p14="http://schemas.microsoft.com/office/powerpoint/2010/main" val="1983202003"/>
+        <p14:creationId xmlns:p14="http://schemas.microsoft.com/office/powerpoint/2010/main" val="1441011240"/>
       </p:ext>
     </p:extLst>
   </p:cSld>
@@ -2482,7 +2490,7 @@
             <a:pPr lvl="0"/>
             <a:r>
               <a:rPr lang="en-US" smtClean="0"/>
-              <a:t>Edit Master text styles</a:t>
+              <a:t>Click to edit Master text styles</a:t>
             </a:r>
           </a:p>
         </p:txBody>
@@ -2510,7 +2518,7 @@
             <a:pPr lvl="0"/>
             <a:r>
               <a:rPr lang="en-US" smtClean="0"/>
-              <a:t>Edit Master text styles</a:t>
+              <a:t>Click to edit Master text styles</a:t>
             </a:r>
           </a:p>
           <a:p>
@@ -2604,7 +2612,7 @@
             <a:pPr lvl="0"/>
             <a:r>
               <a:rPr lang="en-US" smtClean="0"/>
-              <a:t>Edit Master text styles</a:t>
+              <a:t>Click to edit Master text styles</a:t>
             </a:r>
           </a:p>
         </p:txBody>
@@ -2632,7 +2640,7 @@
             <a:pPr lvl="0"/>
             <a:r>
               <a:rPr lang="en-US" smtClean="0"/>
-              <a:t>Edit Master text styles</a:t>
+              <a:t>Click to edit Master text styles</a:t>
             </a:r>
           </a:p>
           <a:p>
@@ -2734,7 +2742,7 @@
     </p:spTree>
     <p:extLst>
       <p:ext uri="{BB962C8B-B14F-4D97-AF65-F5344CB8AC3E}">
-        <p14:creationId xmlns:p14="http://schemas.microsoft.com/office/powerpoint/2010/main" val="2239540879"/>
+        <p14:creationId xmlns:p14="http://schemas.microsoft.com/office/powerpoint/2010/main" val="2225467971"/>
       </p:ext>
     </p:extLst>
   </p:cSld>
@@ -2852,7 +2860,7 @@
     </p:spTree>
     <p:extLst>
       <p:ext uri="{BB962C8B-B14F-4D97-AF65-F5344CB8AC3E}">
-        <p14:creationId xmlns:p14="http://schemas.microsoft.com/office/powerpoint/2010/main" val="3555505736"/>
+        <p14:creationId xmlns:p14="http://schemas.microsoft.com/office/powerpoint/2010/main" val="2307913374"/>
       </p:ext>
     </p:extLst>
   </p:cSld>
@@ -2947,7 +2955,7 @@
     </p:spTree>
     <p:extLst>
       <p:ext uri="{BB962C8B-B14F-4D97-AF65-F5344CB8AC3E}">
-        <p14:creationId xmlns:p14="http://schemas.microsoft.com/office/powerpoint/2010/main" val="2694103645"/>
+        <p14:creationId xmlns:p14="http://schemas.microsoft.com/office/powerpoint/2010/main" val="734866360"/>
       </p:ext>
     </p:extLst>
   </p:cSld>
@@ -3057,7 +3065,7 @@
             <a:pPr lvl="0"/>
             <a:r>
               <a:rPr lang="en-US" smtClean="0"/>
-              <a:t>Edit Master text styles</a:t>
+              <a:t>Click to edit Master text styles</a:t>
             </a:r>
           </a:p>
           <a:p>
@@ -3151,7 +3159,7 @@
             <a:pPr lvl="0"/>
             <a:r>
               <a:rPr lang="en-US" smtClean="0"/>
-              <a:t>Edit Master text styles</a:t>
+              <a:t>Click to edit Master text styles</a:t>
             </a:r>
           </a:p>
         </p:txBody>
@@ -3224,7 +3232,7 @@
     </p:spTree>
     <p:extLst>
       <p:ext uri="{BB962C8B-B14F-4D97-AF65-F5344CB8AC3E}">
-        <p14:creationId xmlns:p14="http://schemas.microsoft.com/office/powerpoint/2010/main" val="2449121717"/>
+        <p14:creationId xmlns:p14="http://schemas.microsoft.com/office/powerpoint/2010/main" val="3546653250"/>
       </p:ext>
     </p:extLst>
   </p:cSld>
@@ -3404,7 +3412,7 @@
             <a:pPr lvl="0"/>
             <a:r>
               <a:rPr lang="en-US" smtClean="0"/>
-              <a:t>Edit Master text styles</a:t>
+              <a:t>Click to edit Master text styles</a:t>
             </a:r>
           </a:p>
         </p:txBody>
@@ -3477,7 +3485,7 @@
     </p:spTree>
     <p:extLst>
       <p:ext uri="{BB962C8B-B14F-4D97-AF65-F5344CB8AC3E}">
-        <p14:creationId xmlns:p14="http://schemas.microsoft.com/office/powerpoint/2010/main" val="3658849042"/>
+        <p14:creationId xmlns:p14="http://schemas.microsoft.com/office/powerpoint/2010/main" val="3972230511"/>
       </p:ext>
     </p:extLst>
   </p:cSld>
@@ -3570,7 +3578,7 @@
             <a:pPr lvl="0"/>
             <a:r>
               <a:rPr lang="en-US" smtClean="0"/>
-              <a:t>Edit Master text styles</a:t>
+              <a:t>Click to edit Master text styles</a:t>
             </a:r>
           </a:p>
           <a:p>
@@ -3726,23 +3734,23 @@
     </p:spTree>
     <p:extLst>
       <p:ext uri="{BB962C8B-B14F-4D97-AF65-F5344CB8AC3E}">
-        <p14:creationId xmlns:p14="http://schemas.microsoft.com/office/powerpoint/2010/main" val="1049651887"/>
+        <p14:creationId xmlns:p14="http://schemas.microsoft.com/office/powerpoint/2010/main" val="51846456"/>
       </p:ext>
     </p:extLst>
   </p:cSld>
   <p:clrMap bg1="lt1" tx1="dk1" bg2="lt2" tx2="dk2" accent1="accent1" accent2="accent2" accent3="accent3" accent4="accent4" accent5="accent5" accent6="accent6" hlink="hlink" folHlink="folHlink"/>
   <p:sldLayoutIdLst>
-    <p:sldLayoutId id="2147483649" r:id="rId1"/>
-    <p:sldLayoutId id="2147483650" r:id="rId2"/>
-    <p:sldLayoutId id="2147483651" r:id="rId3"/>
-    <p:sldLayoutId id="2147483652" r:id="rId4"/>
-    <p:sldLayoutId id="2147483653" r:id="rId5"/>
-    <p:sldLayoutId id="2147483654" r:id="rId6"/>
-    <p:sldLayoutId id="2147483655" r:id="rId7"/>
-    <p:sldLayoutId id="2147483656" r:id="rId8"/>
-    <p:sldLayoutId id="2147483657" r:id="rId9"/>
-    <p:sldLayoutId id="2147483658" r:id="rId10"/>
-    <p:sldLayoutId id="2147483659" r:id="rId11"/>
+    <p:sldLayoutId id="2147483768" r:id="rId1"/>
+    <p:sldLayoutId id="2147483769" r:id="rId2"/>
+    <p:sldLayoutId id="2147483770" r:id="rId3"/>
+    <p:sldLayoutId id="2147483771" r:id="rId4"/>
+    <p:sldLayoutId id="2147483772" r:id="rId5"/>
+    <p:sldLayoutId id="2147483773" r:id="rId6"/>
+    <p:sldLayoutId id="2147483774" r:id="rId7"/>
+    <p:sldLayoutId id="2147483775" r:id="rId8"/>
+    <p:sldLayoutId id="2147483776" r:id="rId9"/>
+    <p:sldLayoutId id="2147483777" r:id="rId10"/>
+    <p:sldLayoutId id="2147483778" r:id="rId11"/>
   </p:sldLayoutIdLst>
   <p:txStyles>
     <p:titleStyle>
@@ -4032,16 +4040,35 @@
   <p:cSld>
     <p:bg>
       <p:bgPr>
-        <a:blipFill dpi="0" rotWithShape="1">
-          <a:blip r:embed="rId2">
-            <a:alphaModFix amt="70000"/>
-            <a:lum/>
-          </a:blip>
-          <a:srcRect/>
-          <a:stretch>
-            <a:fillRect l="-62000" r="-62000"/>
-          </a:stretch>
-        </a:blipFill>
+        <a:gradFill>
+          <a:gsLst>
+            <a:gs pos="0">
+              <a:schemeClr val="accent1">
+                <a:lumMod val="5000"/>
+                <a:lumOff val="95000"/>
+              </a:schemeClr>
+            </a:gs>
+            <a:gs pos="74000">
+              <a:schemeClr val="accent1">
+                <a:lumMod val="45000"/>
+                <a:lumOff val="55000"/>
+              </a:schemeClr>
+            </a:gs>
+            <a:gs pos="83000">
+              <a:schemeClr val="accent1">
+                <a:lumMod val="45000"/>
+                <a:lumOff val="55000"/>
+              </a:schemeClr>
+            </a:gs>
+            <a:gs pos="100000">
+              <a:schemeClr val="accent1">
+                <a:lumMod val="30000"/>
+                <a:lumOff val="70000"/>
+              </a:schemeClr>
+            </a:gs>
+          </a:gsLst>
+          <a:lin ang="5400000" scaled="1"/>
+        </a:gradFill>
         <a:effectLst/>
       </p:bgPr>
     </p:bg>
@@ -4093,7 +4120,7 @@
           <p:nvPr/>
         </p:nvPicPr>
         <p:blipFill>
-          <a:blip r:embed="rId3" cstate="print">
+          <a:blip r:embed="rId2" cstate="print">
             <a:extLst>
               <a:ext uri="{28A0092B-C50C-407E-A947-70E740481C1C}">
                 <a14:useLocalDpi xmlns:a14="http://schemas.microsoft.com/office/drawing/2010/main" val="0"/>
@@ -4132,16 +4159,35 @@
   <p:cSld>
     <p:bg>
       <p:bgPr>
-        <a:blipFill dpi="0" rotWithShape="1">
-          <a:blip r:embed="rId2">
-            <a:alphaModFix amt="70000"/>
-            <a:lum/>
-          </a:blip>
-          <a:srcRect/>
-          <a:stretch>
-            <a:fillRect l="-62000" r="-62000"/>
-          </a:stretch>
-        </a:blipFill>
+        <a:gradFill>
+          <a:gsLst>
+            <a:gs pos="0">
+              <a:schemeClr val="accent1">
+                <a:lumMod val="5000"/>
+                <a:lumOff val="95000"/>
+              </a:schemeClr>
+            </a:gs>
+            <a:gs pos="74000">
+              <a:schemeClr val="accent1">
+                <a:lumMod val="45000"/>
+                <a:lumOff val="55000"/>
+              </a:schemeClr>
+            </a:gs>
+            <a:gs pos="83000">
+              <a:schemeClr val="accent1">
+                <a:lumMod val="45000"/>
+                <a:lumOff val="55000"/>
+              </a:schemeClr>
+            </a:gs>
+            <a:gs pos="100000">
+              <a:schemeClr val="accent1">
+                <a:lumMod val="30000"/>
+                <a:lumOff val="70000"/>
+              </a:schemeClr>
+            </a:gs>
+          </a:gsLst>
+          <a:lin ang="5400000" scaled="1"/>
+        </a:gradFill>
         <a:effectLst/>
       </p:bgPr>
     </p:bg>
@@ -4229,16 +4275,35 @@
   <p:cSld>
     <p:bg>
       <p:bgPr>
-        <a:blipFill dpi="0" rotWithShape="1">
-          <a:blip r:embed="rId3">
-            <a:alphaModFix amt="70000"/>
-            <a:lum/>
-          </a:blip>
-          <a:srcRect/>
-          <a:stretch>
-            <a:fillRect l="-62000" r="-62000"/>
-          </a:stretch>
-        </a:blipFill>
+        <a:gradFill>
+          <a:gsLst>
+            <a:gs pos="0">
+              <a:schemeClr val="accent1">
+                <a:lumMod val="5000"/>
+                <a:lumOff val="95000"/>
+              </a:schemeClr>
+            </a:gs>
+            <a:gs pos="74000">
+              <a:schemeClr val="accent1">
+                <a:lumMod val="45000"/>
+                <a:lumOff val="55000"/>
+              </a:schemeClr>
+            </a:gs>
+            <a:gs pos="83000">
+              <a:schemeClr val="accent1">
+                <a:lumMod val="45000"/>
+                <a:lumOff val="55000"/>
+              </a:schemeClr>
+            </a:gs>
+            <a:gs pos="100000">
+              <a:schemeClr val="accent1">
+                <a:lumMod val="30000"/>
+                <a:lumOff val="70000"/>
+              </a:schemeClr>
+            </a:gs>
+          </a:gsLst>
+          <a:lin ang="5400000" scaled="1"/>
+        </a:gradFill>
         <a:effectLst/>
       </p:bgPr>
     </p:bg>
@@ -4267,7 +4332,7 @@
           </p:nvPr>
         </p:nvPicPr>
         <p:blipFill>
-          <a:blip r:embed="rId4">
+          <a:blip r:embed="rId3">
             <a:extLst>
               <a:ext uri="{28A0092B-C50C-407E-A947-70E740481C1C}">
                 <a14:useLocalDpi xmlns:a14="http://schemas.microsoft.com/office/drawing/2010/main" val="0"/>
@@ -4303,16 +4368,35 @@
   <p:cSld>
     <p:bg>
       <p:bgPr>
-        <a:blipFill dpi="0" rotWithShape="1">
-          <a:blip r:embed="rId2">
-            <a:alphaModFix amt="70000"/>
-            <a:lum/>
-          </a:blip>
-          <a:srcRect/>
-          <a:stretch>
-            <a:fillRect l="-62000" r="-62000"/>
-          </a:stretch>
-        </a:blipFill>
+        <a:gradFill>
+          <a:gsLst>
+            <a:gs pos="0">
+              <a:schemeClr val="accent1">
+                <a:lumMod val="5000"/>
+                <a:lumOff val="95000"/>
+              </a:schemeClr>
+            </a:gs>
+            <a:gs pos="74000">
+              <a:schemeClr val="accent1">
+                <a:lumMod val="45000"/>
+                <a:lumOff val="55000"/>
+              </a:schemeClr>
+            </a:gs>
+            <a:gs pos="83000">
+              <a:schemeClr val="accent1">
+                <a:lumMod val="45000"/>
+                <a:lumOff val="55000"/>
+              </a:schemeClr>
+            </a:gs>
+            <a:gs pos="100000">
+              <a:schemeClr val="accent1">
+                <a:lumMod val="30000"/>
+                <a:lumOff val="70000"/>
+              </a:schemeClr>
+            </a:gs>
+          </a:gsLst>
+          <a:lin ang="5400000" scaled="1"/>
+        </a:gradFill>
         <a:effectLst/>
       </p:bgPr>
     </p:bg>
@@ -4400,16 +4484,35 @@
   <p:cSld>
     <p:bg>
       <p:bgPr>
-        <a:blipFill dpi="0" rotWithShape="1">
-          <a:blip r:embed="rId3">
-            <a:alphaModFix amt="70000"/>
-            <a:lum/>
-          </a:blip>
-          <a:srcRect/>
-          <a:stretch>
-            <a:fillRect l="-62000" r="-62000"/>
-          </a:stretch>
-        </a:blipFill>
+        <a:gradFill>
+          <a:gsLst>
+            <a:gs pos="0">
+              <a:schemeClr val="accent1">
+                <a:lumMod val="5000"/>
+                <a:lumOff val="95000"/>
+              </a:schemeClr>
+            </a:gs>
+            <a:gs pos="74000">
+              <a:schemeClr val="accent1">
+                <a:lumMod val="45000"/>
+                <a:lumOff val="55000"/>
+              </a:schemeClr>
+            </a:gs>
+            <a:gs pos="83000">
+              <a:schemeClr val="accent1">
+                <a:lumMod val="45000"/>
+                <a:lumOff val="55000"/>
+              </a:schemeClr>
+            </a:gs>
+            <a:gs pos="100000">
+              <a:schemeClr val="accent1">
+                <a:lumMod val="30000"/>
+                <a:lumOff val="70000"/>
+              </a:schemeClr>
+            </a:gs>
+          </a:gsLst>
+          <a:lin ang="5400000" scaled="1"/>
+        </a:gradFill>
         <a:effectLst/>
       </p:bgPr>
     </p:bg>
@@ -4618,16 +4721,35 @@
   <p:cSld>
     <p:bg>
       <p:bgPr>
-        <a:blipFill dpi="0" rotWithShape="1">
-          <a:blip r:embed="rId3">
-            <a:alphaModFix amt="70000"/>
-            <a:lum/>
-          </a:blip>
-          <a:srcRect/>
-          <a:stretch>
-            <a:fillRect l="-62000" r="-62000"/>
-          </a:stretch>
-        </a:blipFill>
+        <a:gradFill>
+          <a:gsLst>
+            <a:gs pos="0">
+              <a:schemeClr val="accent1">
+                <a:lumMod val="5000"/>
+                <a:lumOff val="95000"/>
+              </a:schemeClr>
+            </a:gs>
+            <a:gs pos="74000">
+              <a:schemeClr val="accent1">
+                <a:lumMod val="45000"/>
+                <a:lumOff val="55000"/>
+              </a:schemeClr>
+            </a:gs>
+            <a:gs pos="83000">
+              <a:schemeClr val="accent1">
+                <a:lumMod val="45000"/>
+                <a:lumOff val="55000"/>
+              </a:schemeClr>
+            </a:gs>
+            <a:gs pos="100000">
+              <a:schemeClr val="accent1">
+                <a:lumMod val="30000"/>
+                <a:lumOff val="70000"/>
+              </a:schemeClr>
+            </a:gs>
+          </a:gsLst>
+          <a:lin ang="5400000" scaled="1"/>
+        </a:gradFill>
         <a:effectLst/>
       </p:bgPr>
     </p:bg>
@@ -4654,7 +4776,7 @@
           <p:nvPr/>
         </p:nvPicPr>
         <p:blipFill>
-          <a:blip r:embed="rId4">
+          <a:blip r:embed="rId3">
             <a:extLst>
               <a:ext uri="{28A0092B-C50C-407E-A947-70E740481C1C}">
                 <a14:useLocalDpi xmlns:a14="http://schemas.microsoft.com/office/drawing/2010/main" val="0"/>
@@ -4693,16 +4815,35 @@
   <p:cSld>
     <p:bg>
       <p:bgPr>
-        <a:blipFill dpi="0" rotWithShape="1">
-          <a:blip r:embed="rId3">
-            <a:alphaModFix amt="70000"/>
-            <a:lum/>
-          </a:blip>
-          <a:srcRect/>
-          <a:stretch>
-            <a:fillRect l="-62000" r="-62000"/>
-          </a:stretch>
-        </a:blipFill>
+        <a:gradFill>
+          <a:gsLst>
+            <a:gs pos="0">
+              <a:schemeClr val="accent1">
+                <a:lumMod val="5000"/>
+                <a:lumOff val="95000"/>
+              </a:schemeClr>
+            </a:gs>
+            <a:gs pos="74000">
+              <a:schemeClr val="accent1">
+                <a:lumMod val="45000"/>
+                <a:lumOff val="55000"/>
+              </a:schemeClr>
+            </a:gs>
+            <a:gs pos="83000">
+              <a:schemeClr val="accent1">
+                <a:lumMod val="45000"/>
+                <a:lumOff val="55000"/>
+              </a:schemeClr>
+            </a:gs>
+            <a:gs pos="100000">
+              <a:schemeClr val="accent1">
+                <a:lumMod val="30000"/>
+                <a:lumOff val="70000"/>
+              </a:schemeClr>
+            </a:gs>
+          </a:gsLst>
+          <a:lin ang="5400000" scaled="1"/>
+        </a:gradFill>
         <a:effectLst/>
       </p:bgPr>
     </p:bg>
@@ -4806,16 +4947,35 @@
   <p:cSld>
     <p:bg>
       <p:bgPr>
-        <a:blipFill dpi="0" rotWithShape="1">
-          <a:blip r:embed="rId3">
-            <a:alphaModFix amt="70000"/>
-            <a:lum/>
-          </a:blip>
-          <a:srcRect/>
-          <a:stretch>
-            <a:fillRect l="-62000" r="-62000"/>
-          </a:stretch>
-        </a:blipFill>
+        <a:gradFill>
+          <a:gsLst>
+            <a:gs pos="0">
+              <a:schemeClr val="accent1">
+                <a:lumMod val="5000"/>
+                <a:lumOff val="95000"/>
+              </a:schemeClr>
+            </a:gs>
+            <a:gs pos="74000">
+              <a:schemeClr val="accent1">
+                <a:lumMod val="45000"/>
+                <a:lumOff val="55000"/>
+              </a:schemeClr>
+            </a:gs>
+            <a:gs pos="83000">
+              <a:schemeClr val="accent1">
+                <a:lumMod val="45000"/>
+                <a:lumOff val="55000"/>
+              </a:schemeClr>
+            </a:gs>
+            <a:gs pos="100000">
+              <a:schemeClr val="accent1">
+                <a:lumMod val="30000"/>
+                <a:lumOff val="70000"/>
+              </a:schemeClr>
+            </a:gs>
+          </a:gsLst>
+          <a:lin ang="5400000" scaled="1"/>
+        </a:gradFill>
         <a:effectLst/>
       </p:bgPr>
     </p:bg>
@@ -4919,16 +5079,35 @@
   <p:cSld>
     <p:bg>
       <p:bgPr>
-        <a:blipFill dpi="0" rotWithShape="1">
-          <a:blip r:embed="rId3">
-            <a:alphaModFix amt="70000"/>
-            <a:lum/>
-          </a:blip>
-          <a:srcRect/>
-          <a:stretch>
-            <a:fillRect l="-62000" r="-62000"/>
-          </a:stretch>
-        </a:blipFill>
+        <a:gradFill>
+          <a:gsLst>
+            <a:gs pos="0">
+              <a:schemeClr val="accent1">
+                <a:lumMod val="5000"/>
+                <a:lumOff val="95000"/>
+              </a:schemeClr>
+            </a:gs>
+            <a:gs pos="74000">
+              <a:schemeClr val="accent1">
+                <a:lumMod val="45000"/>
+                <a:lumOff val="55000"/>
+              </a:schemeClr>
+            </a:gs>
+            <a:gs pos="83000">
+              <a:schemeClr val="accent1">
+                <a:lumMod val="45000"/>
+                <a:lumOff val="55000"/>
+              </a:schemeClr>
+            </a:gs>
+            <a:gs pos="100000">
+              <a:schemeClr val="accent1">
+                <a:lumMod val="30000"/>
+                <a:lumOff val="70000"/>
+              </a:schemeClr>
+            </a:gs>
+          </a:gsLst>
+          <a:lin ang="5400000" scaled="1"/>
+        </a:gradFill>
         <a:effectLst/>
       </p:bgPr>
     </p:bg>
@@ -5028,7 +5207,7 @@
           <p:nvPr/>
         </p:nvPicPr>
         <p:blipFill>
-          <a:blip r:embed="rId4">
+          <a:blip r:embed="rId3">
             <a:extLst>
               <a:ext uri="{28A0092B-C50C-407E-A947-70E740481C1C}">
                 <a14:useLocalDpi xmlns:a14="http://schemas.microsoft.com/office/drawing/2010/main" val="0"/>
@@ -5067,16 +5246,35 @@
   <p:cSld>
     <p:bg>
       <p:bgPr>
-        <a:blipFill dpi="0" rotWithShape="1">
-          <a:blip r:embed="rId3">
-            <a:alphaModFix amt="70000"/>
-            <a:lum/>
-          </a:blip>
-          <a:srcRect/>
-          <a:stretch>
-            <a:fillRect l="-62000" r="-62000"/>
-          </a:stretch>
-        </a:blipFill>
+        <a:gradFill>
+          <a:gsLst>
+            <a:gs pos="0">
+              <a:schemeClr val="accent1">
+                <a:lumMod val="5000"/>
+                <a:lumOff val="95000"/>
+              </a:schemeClr>
+            </a:gs>
+            <a:gs pos="74000">
+              <a:schemeClr val="accent1">
+                <a:lumMod val="45000"/>
+                <a:lumOff val="55000"/>
+              </a:schemeClr>
+            </a:gs>
+            <a:gs pos="83000">
+              <a:schemeClr val="accent1">
+                <a:lumMod val="45000"/>
+                <a:lumOff val="55000"/>
+              </a:schemeClr>
+            </a:gs>
+            <a:gs pos="100000">
+              <a:schemeClr val="accent1">
+                <a:lumMod val="30000"/>
+                <a:lumOff val="70000"/>
+              </a:schemeClr>
+            </a:gs>
+          </a:gsLst>
+          <a:lin ang="5400000" scaled="1"/>
+        </a:gradFill>
         <a:effectLst/>
       </p:bgPr>
     </p:bg>
@@ -5143,7 +5341,7 @@
           <p:nvPr/>
         </p:nvPicPr>
         <p:blipFill>
-          <a:blip r:embed="rId4">
+          <a:blip r:embed="rId3">
             <a:extLst>
               <a:ext uri="{28A0092B-C50C-407E-A947-70E740481C1C}">
                 <a14:useLocalDpi xmlns:a14="http://schemas.microsoft.com/office/drawing/2010/main" val="0"/>
@@ -5223,9 +5421,9 @@
         <a:latin typeface="Calibri Light" panose="020F0302020204030204"/>
         <a:ea typeface=""/>
         <a:cs typeface=""/>
-        <a:font script="Jpan" typeface="游ゴシック Light"/>
+        <a:font script="Jpan" typeface="ＭＳ Ｐゴシック"/>
         <a:font script="Hang" typeface="맑은 고딕"/>
-        <a:font script="Hans" typeface="等线 Light"/>
+        <a:font script="Hans" typeface="宋体"/>
         <a:font script="Hant" typeface="新細明體"/>
         <a:font script="Arab" typeface="Times New Roman"/>
         <a:font script="Hebr" typeface="Times New Roman"/>
@@ -5258,9 +5456,9 @@
         <a:latin typeface="Calibri" panose="020F0502020204030204"/>
         <a:ea typeface=""/>
         <a:cs typeface=""/>
-        <a:font script="Jpan" typeface="游ゴシック"/>
+        <a:font script="Jpan" typeface="ＭＳ Ｐゴシック"/>
         <a:font script="Hang" typeface="맑은 고딕"/>
-        <a:font script="Hans" typeface="等线"/>
+        <a:font script="Hans" typeface="宋体"/>
         <a:font script="Hant" typeface="新細明體"/>
         <a:font script="Arab" typeface="Arial"/>
         <a:font script="Hebr" typeface="Arial"/>

</xml_diff>